<commit_message>
added 8th lecture prototype
</commit_message>
<xml_diff>
--- a/lections/cpp_craft_lec_3_pre.pptx
+++ b/lections/cpp_craft_lec_3_pre.pptx
@@ -23,7 +23,8 @@
     <p:sldId id="274" r:id="rId17"/>
     <p:sldId id="275" r:id="rId18"/>
     <p:sldId id="276" r:id="rId19"/>
-    <p:sldId id="277" r:id="rId20"/>
+    <p:sldId id="278" r:id="rId20"/>
+    <p:sldId id="277" r:id="rId21"/>
   </p:sldIdLst>
   <p:sldSz cx="9144000" cy="6858000" type="screen4x3"/>
   <p:notesSz cx="6858000" cy="9144000"/>
@@ -17229,7 +17230,7 @@
             <a:fld id="{DD5F5253-2A82-415D-B64E-B977D93B0904}" type="datetimeFigureOut">
               <a:rPr lang="en-US" smtClean="0"/>
               <a:pPr/>
-              <a:t>10/21/2013</a:t>
+              <a:t>11/21/2013</a:t>
             </a:fld>
             <a:endParaRPr lang="en-US"/>
           </a:p>
@@ -17396,7 +17397,7 @@
             <a:fld id="{DD5F5253-2A82-415D-B64E-B977D93B0904}" type="datetimeFigureOut">
               <a:rPr lang="en-US" smtClean="0"/>
               <a:pPr/>
-              <a:t>10/21/2013</a:t>
+              <a:t>11/21/2013</a:t>
             </a:fld>
             <a:endParaRPr lang="en-US"/>
           </a:p>
@@ -17573,7 +17574,7 @@
             <a:fld id="{DD5F5253-2A82-415D-B64E-B977D93B0904}" type="datetimeFigureOut">
               <a:rPr lang="en-US" smtClean="0"/>
               <a:pPr/>
-              <a:t>10/21/2013</a:t>
+              <a:t>11/21/2013</a:t>
             </a:fld>
             <a:endParaRPr lang="en-US"/>
           </a:p>
@@ -17740,7 +17741,7 @@
             <a:fld id="{DD5F5253-2A82-415D-B64E-B977D93B0904}" type="datetimeFigureOut">
               <a:rPr lang="en-US" smtClean="0"/>
               <a:pPr/>
-              <a:t>10/21/2013</a:t>
+              <a:t>11/21/2013</a:t>
             </a:fld>
             <a:endParaRPr lang="en-US"/>
           </a:p>
@@ -17983,7 +17984,7 @@
             <a:fld id="{DD5F5253-2A82-415D-B64E-B977D93B0904}" type="datetimeFigureOut">
               <a:rPr lang="en-US" smtClean="0"/>
               <a:pPr/>
-              <a:t>10/21/2013</a:t>
+              <a:t>11/21/2013</a:t>
             </a:fld>
             <a:endParaRPr lang="en-US"/>
           </a:p>
@@ -18268,7 +18269,7 @@
             <a:fld id="{DD5F5253-2A82-415D-B64E-B977D93B0904}" type="datetimeFigureOut">
               <a:rPr lang="en-US" smtClean="0"/>
               <a:pPr/>
-              <a:t>10/21/2013</a:t>
+              <a:t>11/21/2013</a:t>
             </a:fld>
             <a:endParaRPr lang="en-US"/>
           </a:p>
@@ -18687,7 +18688,7 @@
             <a:fld id="{DD5F5253-2A82-415D-B64E-B977D93B0904}" type="datetimeFigureOut">
               <a:rPr lang="en-US" smtClean="0"/>
               <a:pPr/>
-              <a:t>10/21/2013</a:t>
+              <a:t>11/21/2013</a:t>
             </a:fld>
             <a:endParaRPr lang="en-US"/>
           </a:p>
@@ -18802,7 +18803,7 @@
             <a:fld id="{DD5F5253-2A82-415D-B64E-B977D93B0904}" type="datetimeFigureOut">
               <a:rPr lang="en-US" smtClean="0"/>
               <a:pPr/>
-              <a:t>10/21/2013</a:t>
+              <a:t>11/21/2013</a:t>
             </a:fld>
             <a:endParaRPr lang="en-US"/>
           </a:p>
@@ -18894,7 +18895,7 @@
             <a:fld id="{DD5F5253-2A82-415D-B64E-B977D93B0904}" type="datetimeFigureOut">
               <a:rPr lang="en-US" smtClean="0"/>
               <a:pPr/>
-              <a:t>10/21/2013</a:t>
+              <a:t>11/21/2013</a:t>
             </a:fld>
             <a:endParaRPr lang="en-US"/>
           </a:p>
@@ -19168,7 +19169,7 @@
             <a:fld id="{DD5F5253-2A82-415D-B64E-B977D93B0904}" type="datetimeFigureOut">
               <a:rPr lang="en-US" smtClean="0"/>
               <a:pPr/>
-              <a:t>10/21/2013</a:t>
+              <a:t>11/21/2013</a:t>
             </a:fld>
             <a:endParaRPr lang="en-US"/>
           </a:p>
@@ -19418,7 +19419,7 @@
             <a:fld id="{DD5F5253-2A82-415D-B64E-B977D93B0904}" type="datetimeFigureOut">
               <a:rPr lang="en-US" smtClean="0"/>
               <a:pPr/>
-              <a:t>10/21/2013</a:t>
+              <a:t>11/21/2013</a:t>
             </a:fld>
             <a:endParaRPr lang="en-US"/>
           </a:p>
@@ -19628,7 +19629,7 @@
             <a:fld id="{DD5F5253-2A82-415D-B64E-B977D93B0904}" type="datetimeFigureOut">
               <a:rPr lang="en-US" smtClean="0"/>
               <a:pPr/>
-              <a:t>10/21/2013</a:t>
+              <a:t>11/21/2013</a:t>
             </a:fld>
             <a:endParaRPr lang="en-US"/>
           </a:p>
@@ -22637,31 +22638,101 @@
       </p:grpSpPr>
       <p:sp>
         <p:nvSpPr>
-          <p:cNvPr id="4" name="TextBox 3"/>
-          <p:cNvSpPr txBox="1"/>
-          <p:nvPr/>
+          <p:cNvPr id="2" name="Заголовок 1"/>
+          <p:cNvSpPr>
+            <a:spLocks noGrp="1"/>
+          </p:cNvSpPr>
+          <p:nvPr>
+            <p:ph type="title"/>
+          </p:nvPr>
         </p:nvSpPr>
-        <p:spPr>
-          <a:xfrm>
-            <a:off x="4063642" y="2590800"/>
-            <a:ext cx="660758" cy="1323439"/>
-          </a:xfrm>
-          <a:prstGeom prst="rect">
-            <a:avLst/>
-          </a:prstGeom>
-          <a:noFill/>
-        </p:spPr>
+        <p:spPr/>
         <p:txBody>
-          <a:bodyPr wrap="none" rtlCol="0">
-            <a:spAutoFit/>
+          <a:bodyPr>
+            <a:normAutofit fontScale="90000"/>
           </a:bodyPr>
           <a:lstStyle/>
           <a:p>
             <a:r>
-              <a:rPr lang="en-US" sz="8000" dirty="0" smtClean="0"/>
-              <a:t>?</a:t>
-            </a:r>
-            <a:endParaRPr lang="en-US" sz="8000" dirty="0"/>
+              <a:rPr lang="ru-RU" dirty="0" smtClean="0"/>
+              <a:t>методологии разработки приложений в многопоточной среде</a:t>
+            </a:r>
+            <a:endParaRPr lang="en-US" dirty="0"/>
+          </a:p>
+        </p:txBody>
+      </p:sp>
+      <p:sp>
+        <p:nvSpPr>
+          <p:cNvPr id="3" name="Содержимое 2"/>
+          <p:cNvSpPr>
+            <a:spLocks noGrp="1"/>
+          </p:cNvSpPr>
+          <p:nvPr>
+            <p:ph idx="1"/>
+          </p:nvPr>
+        </p:nvSpPr>
+        <p:spPr/>
+        <p:txBody>
+          <a:bodyPr/>
+          <a:lstStyle/>
+          <a:p>
+            <a:r>
+              <a:rPr lang="ru-RU" dirty="0" smtClean="0"/>
+              <a:t>стандартный подход (</a:t>
+            </a:r>
+            <a:r>
+              <a:rPr lang="ru-RU" dirty="0" err="1" smtClean="0"/>
+              <a:t>мьютексы</a:t>
+            </a:r>
+            <a:r>
+              <a:rPr lang="ru-RU" dirty="0" smtClean="0"/>
+              <a:t>)</a:t>
+            </a:r>
+            <a:r>
+              <a:rPr lang="en-US" dirty="0" smtClean="0"/>
+              <a:t>;</a:t>
+            </a:r>
+            <a:endParaRPr lang="ru-RU" dirty="0" smtClean="0"/>
+          </a:p>
+          <a:p>
+            <a:r>
+              <a:rPr lang="ru-RU" dirty="0" smtClean="0"/>
+              <a:t>атомарные типы</a:t>
+            </a:r>
+            <a:r>
+              <a:rPr lang="en-US" dirty="0" smtClean="0"/>
+              <a:t> (</a:t>
+            </a:r>
+            <a:r>
+              <a:rPr lang="ru-RU" dirty="0" smtClean="0"/>
+              <a:t>задача аккумуляции данных)</a:t>
+            </a:r>
+            <a:r>
+              <a:rPr lang="en-US" dirty="0" smtClean="0"/>
+              <a:t>;</a:t>
+            </a:r>
+            <a:endParaRPr lang="ru-RU" dirty="0" smtClean="0"/>
+          </a:p>
+          <a:p>
+            <a:r>
+              <a:rPr lang="ru-RU" dirty="0" smtClean="0"/>
+              <a:t>синхронизирующий объект</a:t>
+            </a:r>
+            <a:r>
+              <a:rPr lang="en-US" dirty="0" smtClean="0"/>
+              <a:t>;</a:t>
+            </a:r>
+          </a:p>
+          <a:p>
+            <a:r>
+              <a:rPr lang="en-US" dirty="0" smtClean="0"/>
+              <a:t>copy </a:t>
+            </a:r>
+            <a:r>
+              <a:rPr lang="en-US" smtClean="0"/>
+              <a:t>on write.</a:t>
+            </a:r>
+            <a:endParaRPr lang="en-US" dirty="0"/>
           </a:p>
         </p:txBody>
       </p:sp>
@@ -22670,13 +22741,6 @@
   <p:clrMapOvr>
     <a:masterClrMapping/>
   </p:clrMapOvr>
-  <p:timing>
-    <p:tnLst>
-      <p:par>
-        <p:cTn id="1" dur="indefinite" restart="never" nodeType="tmRoot"/>
-      </p:par>
-    </p:tnLst>
-  </p:timing>
 </p:sld>
 </file>
 
@@ -22945,6 +23009,68 @@
           </a:fontRef>
         </p:style>
       </p:cxnSp>
+    </p:spTree>
+  </p:cSld>
+  <p:clrMapOvr>
+    <a:masterClrMapping/>
+  </p:clrMapOvr>
+  <p:timing>
+    <p:tnLst>
+      <p:par>
+        <p:cTn id="1" dur="indefinite" restart="never" nodeType="tmRoot"/>
+      </p:par>
+    </p:tnLst>
+  </p:timing>
+</p:sld>
+</file>
+
+<file path=ppt/slides/slide20.xml><?xml version="1.0" encoding="utf-8"?>
+<p:sld xmlns:a="http://schemas.openxmlformats.org/drawingml/2006/main" xmlns:r="http://schemas.openxmlformats.org/officeDocument/2006/relationships" xmlns:p="http://schemas.openxmlformats.org/presentationml/2006/main">
+  <p:cSld>
+    <p:spTree>
+      <p:nvGrpSpPr>
+        <p:cNvPr id="1" name=""/>
+        <p:cNvGrpSpPr/>
+        <p:nvPr/>
+      </p:nvGrpSpPr>
+      <p:grpSpPr>
+        <a:xfrm>
+          <a:off x="0" y="0"/>
+          <a:ext cx="0" cy="0"/>
+          <a:chOff x="0" y="0"/>
+          <a:chExt cx="0" cy="0"/>
+        </a:xfrm>
+      </p:grpSpPr>
+      <p:sp>
+        <p:nvSpPr>
+          <p:cNvPr id="4" name="TextBox 3"/>
+          <p:cNvSpPr txBox="1"/>
+          <p:nvPr/>
+        </p:nvSpPr>
+        <p:spPr>
+          <a:xfrm>
+            <a:off x="4063642" y="2590800"/>
+            <a:ext cx="660758" cy="1323439"/>
+          </a:xfrm>
+          <a:prstGeom prst="rect">
+            <a:avLst/>
+          </a:prstGeom>
+          <a:noFill/>
+        </p:spPr>
+        <p:txBody>
+          <a:bodyPr wrap="none" rtlCol="0">
+            <a:spAutoFit/>
+          </a:bodyPr>
+          <a:lstStyle/>
+          <a:p>
+            <a:r>
+              <a:rPr lang="en-US" sz="8000" dirty="0" smtClean="0"/>
+              <a:t>?</a:t>
+            </a:r>
+            <a:endParaRPr lang="en-US" sz="8000" dirty="0"/>
+          </a:p>
+        </p:txBody>
+      </p:sp>
     </p:spTree>
   </p:cSld>
   <p:clrMapOvr>

</xml_diff>